<commit_message>
Correcciones finales a sesión 1
</commit_message>
<xml_diff>
--- a/Sesión 1/Introducción.pptx
+++ b/Sesión 1/Introducción.pptx
@@ -580,7 +580,7 @@
           <a:p>
             <a:fld id="{D2E48EB2-32F9-4237-AF21-58311BD979B9}" type="datetimeFigureOut">
               <a:rPr lang="es-CO" smtClean="0"/>
-              <a:t>10/08/2020</a:t>
+              <a:t>18/08/2020</a:t>
             </a:fld>
             <a:endParaRPr lang="es-CO"/>
           </a:p>
@@ -757,7 +757,7 @@
           <a:p>
             <a:fld id="{96E76587-E2F9-44DB-BBD4-105AAC62BCF9}" type="datetimeFigureOut">
               <a:rPr lang="es-419" smtClean="0"/>
-              <a:t>10/8/2020</a:t>
+              <a:t>18/8/2020</a:t>
             </a:fld>
             <a:endParaRPr lang="es-419"/>
           </a:p>
@@ -1577,7 +1577,7 @@
           <a:p>
             <a:fld id="{256C60F9-90AA-42C3-B0A1-8A148CB74EB3}" type="datetime1">
               <a:rPr lang="es-419" smtClean="0"/>
-              <a:t>10/8/2020</a:t>
+              <a:t>18/8/2020</a:t>
             </a:fld>
             <a:endParaRPr lang="es-419" dirty="0"/>
           </a:p>
@@ -1965,7 +1965,7 @@
           <a:p>
             <a:fld id="{5C766506-220D-4F8D-99EC-0D7FFE6CA316}" type="datetime1">
               <a:rPr lang="es-419" smtClean="0"/>
-              <a:t>10/8/2020</a:t>
+              <a:t>18/8/2020</a:t>
             </a:fld>
             <a:endParaRPr lang="es-419"/>
           </a:p>
@@ -2218,7 +2218,7 @@
           <a:p>
             <a:fld id="{6D05D1FF-6175-4A5B-8B2F-9303E69278B9}" type="datetime1">
               <a:rPr lang="es-419" smtClean="0"/>
-              <a:t>10/8/2020</a:t>
+              <a:t>18/8/2020</a:t>
             </a:fld>
             <a:endParaRPr lang="es-419"/>
           </a:p>
@@ -2388,7 +2388,7 @@
           <a:p>
             <a:fld id="{D7D39BE2-CEF0-404D-A719-6C178E68CAA7}" type="datetime1">
               <a:rPr lang="es-419" smtClean="0"/>
-              <a:t>10/8/2020</a:t>
+              <a:t>18/8/2020</a:t>
             </a:fld>
             <a:endParaRPr lang="es-419"/>
           </a:p>
@@ -2568,7 +2568,7 @@
           <a:p>
             <a:fld id="{EC6ED004-2D79-4593-9BED-473EB1F97F71}" type="datetime1">
               <a:rPr lang="es-419" smtClean="0"/>
-              <a:t>10/8/2020</a:t>
+              <a:t>18/8/2020</a:t>
             </a:fld>
             <a:endParaRPr lang="es-419"/>
           </a:p>
@@ -2736,7 +2736,7 @@
           <a:p>
             <a:fld id="{B9966B0F-D3E7-4E71-A621-774D5DC560F2}" type="datetime1">
               <a:rPr lang="es-419" smtClean="0"/>
-              <a:t>10/8/2020</a:t>
+              <a:t>18/8/2020</a:t>
             </a:fld>
             <a:endParaRPr lang="es-419"/>
           </a:p>
@@ -3056,7 +3056,7 @@
           <a:p>
             <a:fld id="{211A0192-6416-4F76-8BF3-4DAB3265EA4B}" type="datetime1">
               <a:rPr lang="es-419" smtClean="0"/>
-              <a:t>10/8/2020</a:t>
+              <a:t>18/8/2020</a:t>
             </a:fld>
             <a:endParaRPr lang="es-419"/>
           </a:p>
@@ -3592,7 +3592,7 @@
           <a:p>
             <a:fld id="{F48D0FAA-865C-45D8-B0AD-92AD0B40DCEA}" type="datetime1">
               <a:rPr lang="es-419" smtClean="0"/>
-              <a:t>10/8/2020</a:t>
+              <a:t>18/8/2020</a:t>
             </a:fld>
             <a:endParaRPr lang="es-419"/>
           </a:p>
@@ -3880,7 +3880,7 @@
           <a:p>
             <a:fld id="{A357A8C0-454F-48F0-AFAD-6E4D07722A9E}" type="datetime1">
               <a:rPr lang="es-419" smtClean="0"/>
-              <a:t>10/8/2020</a:t>
+              <a:t>18/8/2020</a:t>
             </a:fld>
             <a:endParaRPr lang="es-419"/>
           </a:p>
@@ -4121,7 +4121,7 @@
           <a:p>
             <a:fld id="{52C6C16A-DB99-46F8-BCA9-DC46183EAC52}" type="datetime1">
               <a:rPr lang="es-419" smtClean="0"/>
-              <a:t>10/8/2020</a:t>
+              <a:t>18/8/2020</a:t>
             </a:fld>
             <a:endParaRPr lang="es-419"/>
           </a:p>
@@ -4497,7 +4497,7 @@
           <a:p>
             <a:fld id="{A01487A4-709F-44F4-A165-1CC785D6F7C7}" type="datetime1">
               <a:rPr lang="es-419" smtClean="0"/>
-              <a:t>10/8/2020</a:t>
+              <a:t>18/8/2020</a:t>
             </a:fld>
             <a:endParaRPr lang="es-419"/>
           </a:p>
@@ -4615,7 +4615,7 @@
           <a:p>
             <a:fld id="{6BD3EF88-714E-4899-999B-0CD2151F5E45}" type="datetime1">
               <a:rPr lang="es-419" smtClean="0"/>
-              <a:t>10/8/2020</a:t>
+              <a:t>18/8/2020</a:t>
             </a:fld>
             <a:endParaRPr lang="es-419"/>
           </a:p>
@@ -4710,7 +4710,7 @@
           <a:p>
             <a:fld id="{EC180590-A85C-4E50-B391-E283595740A0}" type="datetime1">
               <a:rPr lang="es-419" smtClean="0"/>
-              <a:t>10/8/2020</a:t>
+              <a:t>18/8/2020</a:t>
             </a:fld>
             <a:endParaRPr lang="es-419"/>
           </a:p>
@@ -4923,7 +4923,7 @@
           <a:p>
             <a:fld id="{F14CE208-08FF-49AF-944C-37B7BB464A05}" type="datetime1">
               <a:rPr lang="es-419" smtClean="0"/>
-              <a:t>10/8/2020</a:t>
+              <a:t>18/8/2020</a:t>
             </a:fld>
             <a:endParaRPr lang="es-419"/>
           </a:p>
@@ -6326,21 +6326,12 @@
               <a:rPr lang="es-CO" dirty="0" err="1"/>
               <a:t>Numpy</a:t>
             </a:r>
+            <a:endParaRPr lang="es-CO" dirty="0"/>
+          </a:p>
+          <a:p>
             <a:r>
               <a:rPr lang="es-CO" dirty="0"/>
-              <a:t>*</a:t>
-            </a:r>
-          </a:p>
-          <a:p>
-            <a:r>
-              <a:rPr lang="es-CO" dirty="0"/>
-              <a:t>Pandas*</a:t>
-            </a:r>
-          </a:p>
-          <a:p>
-            <a:r>
-              <a:rPr lang="es-CO" dirty="0"/>
-              <a:t>Jupyter Notebook*</a:t>
+              <a:t>Pandas</a:t>
             </a:r>
           </a:p>
           <a:p>
@@ -6348,10 +6339,7 @@
               <a:rPr lang="es-CO" dirty="0" err="1"/>
               <a:t>Matplotlib</a:t>
             </a:r>
-            <a:r>
-              <a:rPr lang="es-CO" dirty="0"/>
-              <a:t>*</a:t>
-            </a:r>
+            <a:endParaRPr lang="es-CO" dirty="0"/>
           </a:p>
         </p:txBody>
       </p:sp>

</xml_diff>